<commit_message>
More work on data quality chapter
</commit_message>
<xml_diff>
--- a/extras/FiguresDataQuality.pptx
+++ b/extras/FiguresDataQuality.pptx
@@ -6,6 +6,7 @@
   </p:sldMasterIdLst>
   <p:sldIdLst>
     <p:sldId id="266" r:id="rId2"/>
+    <p:sldId id="267" r:id="rId3"/>
   </p:sldIdLst>
   <p:sldSz cx="12192000" cy="6858000"/>
   <p:notesSz cx="6858000" cy="9144000"/>
@@ -259,7 +260,7 @@
           <a:p>
             <a:fld id="{05EFC541-71C0-43FA-B841-C6A9FD087892}" type="datetimeFigureOut">
               <a:rPr lang="en-US" smtClean="0"/>
-              <a:t>8/8/2019</a:t>
+              <a:t>8/11/2019</a:t>
             </a:fld>
             <a:endParaRPr lang="en-US"/>
           </a:p>
@@ -457,7 +458,7 @@
           <a:p>
             <a:fld id="{05EFC541-71C0-43FA-B841-C6A9FD087892}" type="datetimeFigureOut">
               <a:rPr lang="en-US" smtClean="0"/>
-              <a:t>8/8/2019</a:t>
+              <a:t>8/11/2019</a:t>
             </a:fld>
             <a:endParaRPr lang="en-US"/>
           </a:p>
@@ -665,7 +666,7 @@
           <a:p>
             <a:fld id="{05EFC541-71C0-43FA-B841-C6A9FD087892}" type="datetimeFigureOut">
               <a:rPr lang="en-US" smtClean="0"/>
-              <a:t>8/8/2019</a:t>
+              <a:t>8/11/2019</a:t>
             </a:fld>
             <a:endParaRPr lang="en-US"/>
           </a:p>
@@ -863,7 +864,7 @@
           <a:p>
             <a:fld id="{05EFC541-71C0-43FA-B841-C6A9FD087892}" type="datetimeFigureOut">
               <a:rPr lang="en-US" smtClean="0"/>
-              <a:t>8/8/2019</a:t>
+              <a:t>8/11/2019</a:t>
             </a:fld>
             <a:endParaRPr lang="en-US"/>
           </a:p>
@@ -1138,7 +1139,7 @@
           <a:p>
             <a:fld id="{05EFC541-71C0-43FA-B841-C6A9FD087892}" type="datetimeFigureOut">
               <a:rPr lang="en-US" smtClean="0"/>
-              <a:t>8/8/2019</a:t>
+              <a:t>8/11/2019</a:t>
             </a:fld>
             <a:endParaRPr lang="en-US"/>
           </a:p>
@@ -1403,7 +1404,7 @@
           <a:p>
             <a:fld id="{05EFC541-71C0-43FA-B841-C6A9FD087892}" type="datetimeFigureOut">
               <a:rPr lang="en-US" smtClean="0"/>
-              <a:t>8/8/2019</a:t>
+              <a:t>8/11/2019</a:t>
             </a:fld>
             <a:endParaRPr lang="en-US"/>
           </a:p>
@@ -1815,7 +1816,7 @@
           <a:p>
             <a:fld id="{05EFC541-71C0-43FA-B841-C6A9FD087892}" type="datetimeFigureOut">
               <a:rPr lang="en-US" smtClean="0"/>
-              <a:t>8/8/2019</a:t>
+              <a:t>8/11/2019</a:t>
             </a:fld>
             <a:endParaRPr lang="en-US"/>
           </a:p>
@@ -1956,7 +1957,7 @@
           <a:p>
             <a:fld id="{05EFC541-71C0-43FA-B841-C6A9FD087892}" type="datetimeFigureOut">
               <a:rPr lang="en-US" smtClean="0"/>
-              <a:t>8/8/2019</a:t>
+              <a:t>8/11/2019</a:t>
             </a:fld>
             <a:endParaRPr lang="en-US"/>
           </a:p>
@@ -2069,7 +2070,7 @@
           <a:p>
             <a:fld id="{05EFC541-71C0-43FA-B841-C6A9FD087892}" type="datetimeFigureOut">
               <a:rPr lang="en-US" smtClean="0"/>
-              <a:t>8/8/2019</a:t>
+              <a:t>8/11/2019</a:t>
             </a:fld>
             <a:endParaRPr lang="en-US"/>
           </a:p>
@@ -2380,7 +2381,7 @@
           <a:p>
             <a:fld id="{05EFC541-71C0-43FA-B841-C6A9FD087892}" type="datetimeFigureOut">
               <a:rPr lang="en-US" smtClean="0"/>
-              <a:t>8/8/2019</a:t>
+              <a:t>8/11/2019</a:t>
             </a:fld>
             <a:endParaRPr lang="en-US"/>
           </a:p>
@@ -2668,7 +2669,7 @@
           <a:p>
             <a:fld id="{05EFC541-71C0-43FA-B841-C6A9FD087892}" type="datetimeFigureOut">
               <a:rPr lang="en-US" smtClean="0"/>
-              <a:t>8/8/2019</a:t>
+              <a:t>8/11/2019</a:t>
             </a:fld>
             <a:endParaRPr lang="en-US"/>
           </a:p>
@@ -2909,7 +2910,7 @@
           <a:p>
             <a:fld id="{05EFC541-71C0-43FA-B841-C6A9FD087892}" type="datetimeFigureOut">
               <a:rPr lang="en-US" smtClean="0"/>
-              <a:t>8/8/2019</a:t>
+              <a:t>8/11/2019</a:t>
             </a:fld>
             <a:endParaRPr lang="en-US"/>
           </a:p>
@@ -4442,6 +4443,306 @@
 </p:sld>
 </file>
 
+<file path=ppt/slides/slide2.xml><?xml version="1.0" encoding="utf-8"?>
+<p:sld xmlns:a="http://schemas.openxmlformats.org/drawingml/2006/main" xmlns:r="http://schemas.openxmlformats.org/officeDocument/2006/relationships" xmlns:p="http://schemas.openxmlformats.org/presentationml/2006/main">
+  <p:cSld>
+    <p:spTree>
+      <p:nvGrpSpPr>
+        <p:cNvPr id="1" name=""/>
+        <p:cNvGrpSpPr/>
+        <p:nvPr/>
+      </p:nvGrpSpPr>
+      <p:grpSpPr>
+        <a:xfrm>
+          <a:off x="0" y="0"/>
+          <a:ext cx="0" cy="0"/>
+          <a:chOff x="0" y="0"/>
+          <a:chExt cx="0" cy="0"/>
+        </a:xfrm>
+      </p:grpSpPr>
+      <p:sp>
+        <p:nvSpPr>
+          <p:cNvPr id="24" name="Rectangle: Rounded Corners 23">
+            <a:extLst>
+              <a:ext uri="{FF2B5EF4-FFF2-40B4-BE49-F238E27FC236}">
+                <a16:creationId xmlns:a16="http://schemas.microsoft.com/office/drawing/2014/main" id="{88D7B64C-261C-41EB-BFAA-B4F6DEC5C759}"/>
+              </a:ext>
+            </a:extLst>
+          </p:cNvPr>
+          <p:cNvSpPr/>
+          <p:nvPr/>
+        </p:nvSpPr>
+        <p:spPr>
+          <a:xfrm>
+            <a:off x="109401" y="1065280"/>
+            <a:ext cx="1389876" cy="691855"/>
+          </a:xfrm>
+          <a:prstGeom prst="roundRect">
+            <a:avLst/>
+          </a:prstGeom>
+          <a:solidFill>
+            <a:srgbClr val="44AED8"/>
+          </a:solidFill>
+          <a:ln>
+            <a:noFill/>
+          </a:ln>
+        </p:spPr>
+        <p:style>
+          <a:lnRef idx="2">
+            <a:schemeClr val="accent5">
+              <a:shade val="50000"/>
+            </a:schemeClr>
+          </a:lnRef>
+          <a:fillRef idx="1">
+            <a:schemeClr val="accent5"/>
+          </a:fillRef>
+          <a:effectRef idx="0">
+            <a:schemeClr val="accent5"/>
+          </a:effectRef>
+          <a:fontRef idx="minor">
+            <a:schemeClr val="lt1"/>
+          </a:fontRef>
+        </p:style>
+        <p:txBody>
+          <a:bodyPr rtlCol="0" anchor="ctr"/>
+          <a:lstStyle/>
+          <a:p>
+            <a:pPr algn="ctr"/>
+            <a:r>
+              <a:rPr lang="en-US" sz="1100" dirty="0"/>
+              <a:t>J85.0</a:t>
+            </a:r>
+          </a:p>
+          <a:p>
+            <a:pPr algn="ctr"/>
+            <a:r>
+              <a:rPr lang="en-US" sz="1100" dirty="0"/>
+              <a:t>Gangrene and necrosis of lung</a:t>
+            </a:r>
+          </a:p>
+        </p:txBody>
+      </p:sp>
+      <p:sp>
+        <p:nvSpPr>
+          <p:cNvPr id="25" name="Rectangle: Rounded Corners 24">
+            <a:extLst>
+              <a:ext uri="{FF2B5EF4-FFF2-40B4-BE49-F238E27FC236}">
+                <a16:creationId xmlns:a16="http://schemas.microsoft.com/office/drawing/2014/main" id="{CB4F5200-E819-4ABB-A156-B4381211A992}"/>
+              </a:ext>
+            </a:extLst>
+          </p:cNvPr>
+          <p:cNvSpPr/>
+          <p:nvPr/>
+        </p:nvSpPr>
+        <p:spPr>
+          <a:xfrm>
+            <a:off x="2521723" y="1065280"/>
+            <a:ext cx="1389876" cy="691855"/>
+          </a:xfrm>
+          <a:prstGeom prst="roundRect">
+            <a:avLst/>
+          </a:prstGeom>
+          <a:solidFill>
+            <a:srgbClr val="1B6583"/>
+          </a:solidFill>
+          <a:ln>
+            <a:noFill/>
+          </a:ln>
+        </p:spPr>
+        <p:style>
+          <a:lnRef idx="2">
+            <a:schemeClr val="accent5">
+              <a:shade val="50000"/>
+            </a:schemeClr>
+          </a:lnRef>
+          <a:fillRef idx="1">
+            <a:schemeClr val="accent5"/>
+          </a:fillRef>
+          <a:effectRef idx="0">
+            <a:schemeClr val="accent5"/>
+          </a:effectRef>
+          <a:fontRef idx="minor">
+            <a:schemeClr val="lt1"/>
+          </a:fontRef>
+        </p:style>
+        <p:txBody>
+          <a:bodyPr rtlCol="0" anchor="ctr"/>
+          <a:lstStyle/>
+          <a:p>
+            <a:pPr algn="ctr"/>
+            <a:r>
+              <a:rPr lang="en-US" sz="1100" dirty="0"/>
+              <a:t>4324261</a:t>
+            </a:r>
+          </a:p>
+          <a:p>
+            <a:pPr algn="ctr"/>
+            <a:r>
+              <a:rPr lang="en-US" sz="1100" dirty="0"/>
+              <a:t>Pulmonary necrosis</a:t>
+            </a:r>
+          </a:p>
+        </p:txBody>
+      </p:sp>
+      <p:sp>
+        <p:nvSpPr>
+          <p:cNvPr id="27" name="Arrow: Right 26">
+            <a:extLst>
+              <a:ext uri="{FF2B5EF4-FFF2-40B4-BE49-F238E27FC236}">
+                <a16:creationId xmlns:a16="http://schemas.microsoft.com/office/drawing/2014/main" id="{7CC86EBF-31FF-45D1-98B1-A5EE26C7057A}"/>
+              </a:ext>
+            </a:extLst>
+          </p:cNvPr>
+          <p:cNvSpPr/>
+          <p:nvPr/>
+        </p:nvSpPr>
+        <p:spPr>
+          <a:xfrm>
+            <a:off x="1591733" y="1118499"/>
+            <a:ext cx="837534" cy="585416"/>
+          </a:xfrm>
+          <a:prstGeom prst="rightArrow">
+            <a:avLst/>
+          </a:prstGeom>
+        </p:spPr>
+        <p:style>
+          <a:lnRef idx="2">
+            <a:schemeClr val="dk1">
+              <a:shade val="50000"/>
+            </a:schemeClr>
+          </a:lnRef>
+          <a:fillRef idx="1">
+            <a:schemeClr val="dk1"/>
+          </a:fillRef>
+          <a:effectRef idx="0">
+            <a:schemeClr val="dk1"/>
+          </a:effectRef>
+          <a:fontRef idx="minor">
+            <a:schemeClr val="lt1"/>
+          </a:fontRef>
+        </p:style>
+        <p:txBody>
+          <a:bodyPr rtlCol="0" anchor="ctr"/>
+          <a:lstStyle/>
+          <a:p>
+            <a:pPr algn="ctr"/>
+            <a:r>
+              <a:rPr lang="en-US" sz="1100" dirty="0"/>
+              <a:t>Maps to</a:t>
+            </a:r>
+          </a:p>
+        </p:txBody>
+      </p:sp>
+      <p:sp>
+        <p:nvSpPr>
+          <p:cNvPr id="31" name="Rectangle: Rounded Corners 30">
+            <a:extLst>
+              <a:ext uri="{FF2B5EF4-FFF2-40B4-BE49-F238E27FC236}">
+                <a16:creationId xmlns:a16="http://schemas.microsoft.com/office/drawing/2014/main" id="{05276B88-6D0C-44D1-8236-3ECF44B7B3DC}"/>
+              </a:ext>
+            </a:extLst>
+          </p:cNvPr>
+          <p:cNvSpPr/>
+          <p:nvPr/>
+        </p:nvSpPr>
+        <p:spPr>
+          <a:xfrm>
+            <a:off x="2521723" y="106823"/>
+            <a:ext cx="1389876" cy="691855"/>
+          </a:xfrm>
+          <a:prstGeom prst="roundRect">
+            <a:avLst/>
+          </a:prstGeom>
+          <a:solidFill>
+            <a:srgbClr val="1B6583"/>
+          </a:solidFill>
+          <a:ln>
+            <a:noFill/>
+          </a:ln>
+        </p:spPr>
+        <p:style>
+          <a:lnRef idx="2">
+            <a:schemeClr val="accent5">
+              <a:shade val="50000"/>
+            </a:schemeClr>
+          </a:lnRef>
+          <a:fillRef idx="1">
+            <a:schemeClr val="accent5"/>
+          </a:fillRef>
+          <a:effectRef idx="0">
+            <a:schemeClr val="accent5"/>
+          </a:effectRef>
+          <a:fontRef idx="minor">
+            <a:schemeClr val="lt1"/>
+          </a:fontRef>
+        </p:style>
+        <p:txBody>
+          <a:bodyPr rtlCol="0" anchor="ctr"/>
+          <a:lstStyle/>
+          <a:p>
+            <a:pPr algn="ctr"/>
+            <a:r>
+              <a:rPr lang="en-US" sz="1100" dirty="0"/>
+              <a:t>439928</a:t>
+            </a:r>
+          </a:p>
+          <a:p>
+            <a:pPr algn="ctr"/>
+            <a:r>
+              <a:rPr lang="en-US" sz="1100" dirty="0"/>
+              <a:t>Gangrenous disorder</a:t>
+            </a:r>
+          </a:p>
+        </p:txBody>
+      </p:sp>
+      <p:sp>
+        <p:nvSpPr>
+          <p:cNvPr id="32" name="TextBox 31">
+            <a:extLst>
+              <a:ext uri="{FF2B5EF4-FFF2-40B4-BE49-F238E27FC236}">
+                <a16:creationId xmlns:a16="http://schemas.microsoft.com/office/drawing/2014/main" id="{300C7814-A71E-48DA-968A-84CD8E29CDDB}"/>
+              </a:ext>
+            </a:extLst>
+          </p:cNvPr>
+          <p:cNvSpPr txBox="1"/>
+          <p:nvPr/>
+        </p:nvSpPr>
+        <p:spPr>
+          <a:xfrm>
+            <a:off x="3108404" y="803670"/>
+            <a:ext cx="198568" cy="261610"/>
+          </a:xfrm>
+          <a:prstGeom prst="rect">
+            <a:avLst/>
+          </a:prstGeom>
+          <a:noFill/>
+        </p:spPr>
+        <p:txBody>
+          <a:bodyPr wrap="square" rtlCol="0">
+            <a:spAutoFit/>
+          </a:bodyPr>
+          <a:lstStyle/>
+          <a:p>
+            <a:r>
+              <a:rPr lang="en-US" sz="1100" dirty="0"/>
+              <a:t>?</a:t>
+            </a:r>
+          </a:p>
+        </p:txBody>
+      </p:sp>
+    </p:spTree>
+    <p:extLst>
+      <p:ext uri="{BB962C8B-B14F-4D97-AF65-F5344CB8AC3E}">
+        <p14:creationId xmlns:p14="http://schemas.microsoft.com/office/powerpoint/2010/main" val="3879873528"/>
+      </p:ext>
+    </p:extLst>
+  </p:cSld>
+  <p:clrMapOvr>
+    <a:masterClrMapping/>
+  </p:clrMapOvr>
+</p:sld>
+</file>
+
 <file path=ppt/theme/theme1.xml><?xml version="1.0" encoding="utf-8"?>
 <a:theme xmlns:a="http://schemas.openxmlformats.org/drawingml/2006/main" name="Office Theme">
   <a:themeElements>

</xml_diff>